<commit_message>
modified:   AIOPS/AIOPS For Transceiver Monitoring.pptx 	deleted:    AIOPS/fcs_error_high.txt 	deleted:    AIOPS/link_down.txt 	deleted:    AIOPS/link_up.txt 	deleted:    AIOPS/rx_power_low.txt
</commit_message>
<xml_diff>
--- a/AIOPS/AIOPS For Transceiver Monitoring.pptx
+++ b/AIOPS/AIOPS For Transceiver Monitoring.pptx
@@ -3188,15 +3188,7 @@
           </a:r>
           <a:r>
             <a:rPr lang="ko-KR" altLang="en-US" sz="1400" dirty="0"/>
-            <a:t>정보를 추가 하여 제조사 및 광 모듈 종류별 특성을 학습하여 적용 가능성을 높이고 </a:t>
-          </a:r>
-          <a:r>
-            <a:rPr lang="en-US" altLang="en-US" sz="1400" dirty="0"/>
-            <a:t>Vendor </a:t>
-          </a:r>
-          <a:r>
-            <a:rPr lang="ko-KR" altLang="en-US" sz="1400" dirty="0"/>
-            <a:t>나 광 모듈 별 학습을 통합하여 실행한다</a:t>
+            <a:t>정보를 추가 하여 제조사 및 광 모듈 종류별 특성을 수집하고 이를 제품 품질관리에 활용한다</a:t>
           </a:r>
           <a:r>
             <a:rPr lang="en-US" altLang="ko-KR" sz="1400" dirty="0"/>
@@ -3245,15 +3237,23 @@
         <a:p>
           <a:r>
             <a:rPr lang="ko-KR" altLang="en-US" sz="1400" dirty="0"/>
-            <a:t>수집된 </a:t>
+            <a:t>향후 </a:t>
           </a:r>
           <a:r>
             <a:rPr lang="en-US" altLang="ko-KR" sz="1400" dirty="0"/>
-            <a:t>data</a:t>
+            <a:t>AI </a:t>
           </a:r>
           <a:r>
             <a:rPr lang="ko-KR" altLang="en-US" sz="1400" dirty="0"/>
-            <a:t>들을 바탕으로 상황에 따른 자동화 기능을 구현한다</a:t>
+            <a:t>적용을</a:t>
+          </a:r>
+          <a:r>
+            <a:rPr lang="en-US" altLang="ko-KR" sz="1400" dirty="0"/>
+            <a:t> </a:t>
+          </a:r>
+          <a:r>
+            <a:rPr lang="ko-KR" altLang="en-US" sz="1400" dirty="0"/>
+            <a:t>위한 기초 데이터로 활용한다</a:t>
           </a:r>
           <a:r>
             <a:rPr lang="en-US" sz="1400" dirty="0"/>
@@ -3544,13 +3544,31 @@
             <a:t> </a:t>
           </a:r>
           <a:r>
-            <a:rPr lang="ko-KR" altLang="ko-KR" sz="1400" spc="-25" dirty="0" err="1">
+            <a:rPr lang="ko-KR" altLang="ko-KR" sz="1400" spc="-25" dirty="0">
               <a:effectLst/>
               <a:latin typeface="inherit"/>
               <a:ea typeface="굴림" panose="020B0600000101010101" pitchFamily="50" charset="-127"/>
               <a:cs typeface="Arial" panose="020B0604020202020204" pitchFamily="34" charset="0"/>
             </a:rPr>
-            <a:t>상황별</a:t>
+            <a:t>상황</a:t>
+          </a:r>
+          <a:r>
+            <a:rPr lang="en-US" altLang="ko-KR" sz="1400" spc="-25" dirty="0">
+              <a:effectLst/>
+              <a:latin typeface="inherit"/>
+              <a:ea typeface="굴림" panose="020B0600000101010101" pitchFamily="50" charset="-127"/>
+              <a:cs typeface="Arial" panose="020B0604020202020204" pitchFamily="34" charset="0"/>
+            </a:rPr>
+            <a:t> </a:t>
+          </a:r>
+          <a:r>
+            <a:rPr lang="ko-KR" altLang="ko-KR" sz="1400" spc="-25" dirty="0">
+              <a:effectLst/>
+              <a:latin typeface="inherit"/>
+              <a:ea typeface="굴림" panose="020B0600000101010101" pitchFamily="50" charset="-127"/>
+              <a:cs typeface="Arial" panose="020B0604020202020204" pitchFamily="34" charset="0"/>
+            </a:rPr>
+            <a:t>별</a:t>
           </a:r>
           <a:r>
             <a:rPr lang="ko-KR" altLang="ko-KR" sz="1400" spc="-25" dirty="0">
@@ -5091,15 +5109,7 @@
           </a:r>
           <a:r>
             <a:rPr lang="ko-KR" altLang="en-US" sz="1400" kern="1200" dirty="0"/>
-            <a:t>정보를 추가 하여 제조사 및 광 모듈 종류별 특성을 학습하여 적용 가능성을 높이고 </a:t>
-          </a:r>
-          <a:r>
-            <a:rPr lang="en-US" altLang="en-US" sz="1400" kern="1200" dirty="0"/>
-            <a:t>Vendor </a:t>
-          </a:r>
-          <a:r>
-            <a:rPr lang="ko-KR" altLang="en-US" sz="1400" kern="1200" dirty="0"/>
-            <a:t>나 광 모듈 별 학습을 통합하여 실행한다</a:t>
+            <a:t>정보를 추가 하여 제조사 및 광 모듈 종류별 특성을 수집하고 이를 제품 품질관리에 활용한다</a:t>
           </a:r>
           <a:r>
             <a:rPr lang="en-US" altLang="ko-KR" sz="1400" kern="1200" dirty="0"/>
@@ -5220,15 +5230,23 @@
           </a:pPr>
           <a:r>
             <a:rPr lang="ko-KR" altLang="en-US" sz="1400" kern="1200" dirty="0"/>
-            <a:t>수집된 </a:t>
+            <a:t>향후 </a:t>
           </a:r>
           <a:r>
             <a:rPr lang="en-US" altLang="ko-KR" sz="1400" kern="1200" dirty="0"/>
-            <a:t>data</a:t>
+            <a:t>AI </a:t>
           </a:r>
           <a:r>
             <a:rPr lang="ko-KR" altLang="en-US" sz="1400" kern="1200" dirty="0"/>
-            <a:t>들을 바탕으로 상황에 따른 자동화 기능을 구현한다</a:t>
+            <a:t>적용을</a:t>
+          </a:r>
+          <a:r>
+            <a:rPr lang="en-US" altLang="ko-KR" sz="1400" kern="1200" dirty="0"/>
+            <a:t> </a:t>
+          </a:r>
+          <a:r>
+            <a:rPr lang="ko-KR" altLang="en-US" sz="1400" kern="1200" dirty="0"/>
+            <a:t>위한 기초 데이터로 활용한다</a:t>
           </a:r>
           <a:r>
             <a:rPr lang="en-US" sz="1400" kern="1200" dirty="0"/>
@@ -5582,13 +5600,31 @@
             <a:t> </a:t>
           </a:r>
           <a:r>
-            <a:rPr lang="ko-KR" altLang="ko-KR" sz="1400" kern="1200" spc="-25" dirty="0" err="1">
+            <a:rPr lang="ko-KR" altLang="ko-KR" sz="1400" kern="1200" spc="-25" dirty="0">
               <a:effectLst/>
               <a:latin typeface="inherit"/>
               <a:ea typeface="굴림" panose="020B0600000101010101" pitchFamily="50" charset="-127"/>
               <a:cs typeface="Arial" panose="020B0604020202020204" pitchFamily="34" charset="0"/>
             </a:rPr>
-            <a:t>상황별</a:t>
+            <a:t>상황</a:t>
+          </a:r>
+          <a:r>
+            <a:rPr lang="en-US" altLang="ko-KR" sz="1400" kern="1200" spc="-25" dirty="0">
+              <a:effectLst/>
+              <a:latin typeface="inherit"/>
+              <a:ea typeface="굴림" panose="020B0600000101010101" pitchFamily="50" charset="-127"/>
+              <a:cs typeface="Arial" panose="020B0604020202020204" pitchFamily="34" charset="0"/>
+            </a:rPr>
+            <a:t> </a:t>
+          </a:r>
+          <a:r>
+            <a:rPr lang="ko-KR" altLang="ko-KR" sz="1400" kern="1200" spc="-25" dirty="0">
+              <a:effectLst/>
+              <a:latin typeface="inherit"/>
+              <a:ea typeface="굴림" panose="020B0600000101010101" pitchFamily="50" charset="-127"/>
+              <a:cs typeface="Arial" panose="020B0604020202020204" pitchFamily="34" charset="0"/>
+            </a:rPr>
+            <a:t>별</a:t>
           </a:r>
           <a:r>
             <a:rPr lang="ko-KR" altLang="ko-KR" sz="1400" kern="1200" spc="-25" dirty="0">
@@ -14589,7 +14625,7 @@
           </p:nvSpPr>
           <p:spPr>
             <a:xfrm>
-              <a:off x="59399" y="3030668"/>
+              <a:off x="75114" y="3030668"/>
               <a:ext cx="10396802" cy="1113342"/>
             </a:xfrm>
             <a:prstGeom prst="rect">
@@ -14793,6 +14829,27 @@
                 <a:t>Log saved to fcs_error_high.txt</a:t>
               </a:r>
             </a:p>
+            <a:p>
+              <a:pPr defTabSz="622300">
+                <a:lnSpc>
+                  <a:spcPct val="90000"/>
+                </a:lnSpc>
+                <a:spcBef>
+                  <a:spcPct val="0"/>
+                </a:spcBef>
+                <a:spcAft>
+                  <a:spcPct val="35000"/>
+                </a:spcAft>
+              </a:pPr>
+              <a:r>
+                <a:rPr lang="en-US" altLang="ko-KR" sz="1400" dirty="0">
+                  <a:solidFill>
+                    <a:schemeClr val="tx1"/>
+                  </a:solidFill>
+                </a:rPr>
+                <a:t>[INFO] Event and prediction saved to Event_and_Prediction.csv</a:t>
+              </a:r>
+            </a:p>
           </p:txBody>
         </p:sp>
       </p:grpSp>
@@ -14946,6 +15003,112 @@
           </a:p>
         </p:txBody>
       </p:sp>
+      <p:sp>
+        <p:nvSpPr>
+          <p:cNvPr id="10" name="직사각형 9">
+            <a:extLst>
+              <a:ext uri="{FF2B5EF4-FFF2-40B4-BE49-F238E27FC236}">
+                <a16:creationId xmlns:a16="http://schemas.microsoft.com/office/drawing/2014/main" id="{885253EA-61E0-B0D5-50CE-79B80AD6A293}"/>
+              </a:ext>
+            </a:extLst>
+          </p:cNvPr>
+          <p:cNvSpPr/>
+          <p:nvPr/>
+        </p:nvSpPr>
+        <p:spPr>
+          <a:xfrm>
+            <a:off x="790192" y="1180209"/>
+            <a:ext cx="10193245" cy="691118"/>
+          </a:xfrm>
+          <a:prstGeom prst="rect">
+            <a:avLst/>
+          </a:prstGeom>
+          <a:noFill/>
+          <a:ln w="31750">
+            <a:solidFill>
+              <a:srgbClr val="00B050"/>
+            </a:solidFill>
+            <a:prstDash val="dash"/>
+          </a:ln>
+        </p:spPr>
+        <p:style>
+          <a:lnRef idx="2">
+            <a:schemeClr val="accent1">
+              <a:shade val="15000"/>
+            </a:schemeClr>
+          </a:lnRef>
+          <a:fillRef idx="1">
+            <a:schemeClr val="accent1"/>
+          </a:fillRef>
+          <a:effectRef idx="0">
+            <a:schemeClr val="accent1"/>
+          </a:effectRef>
+          <a:fontRef idx="minor">
+            <a:schemeClr val="lt1"/>
+          </a:fontRef>
+        </p:style>
+        <p:txBody>
+          <a:bodyPr rtlCol="0" anchor="ctr"/>
+          <a:lstStyle/>
+          <a:p>
+            <a:pPr algn="ctr"/>
+            <a:endParaRPr lang="ko-KR" altLang="en-US"/>
+          </a:p>
+        </p:txBody>
+      </p:sp>
+      <p:sp>
+        <p:nvSpPr>
+          <p:cNvPr id="12" name="직사각형 11">
+            <a:extLst>
+              <a:ext uri="{FF2B5EF4-FFF2-40B4-BE49-F238E27FC236}">
+                <a16:creationId xmlns:a16="http://schemas.microsoft.com/office/drawing/2014/main" id="{D4636A7A-1676-F75E-BC00-FB05B2128500}"/>
+              </a:ext>
+            </a:extLst>
+          </p:cNvPr>
+          <p:cNvSpPr/>
+          <p:nvPr/>
+        </p:nvSpPr>
+        <p:spPr>
+          <a:xfrm>
+            <a:off x="804369" y="2304370"/>
+            <a:ext cx="5291632" cy="691118"/>
+          </a:xfrm>
+          <a:prstGeom prst="rect">
+            <a:avLst/>
+          </a:prstGeom>
+          <a:noFill/>
+          <a:ln w="31750">
+            <a:solidFill>
+              <a:srgbClr val="00B050"/>
+            </a:solidFill>
+            <a:prstDash val="dash"/>
+          </a:ln>
+        </p:spPr>
+        <p:style>
+          <a:lnRef idx="2">
+            <a:schemeClr val="accent1">
+              <a:shade val="15000"/>
+            </a:schemeClr>
+          </a:lnRef>
+          <a:fillRef idx="1">
+            <a:schemeClr val="accent1"/>
+          </a:fillRef>
+          <a:effectRef idx="0">
+            <a:schemeClr val="accent1"/>
+          </a:effectRef>
+          <a:fontRef idx="minor">
+            <a:schemeClr val="lt1"/>
+          </a:fontRef>
+        </p:style>
+        <p:txBody>
+          <a:bodyPr rtlCol="0" anchor="ctr"/>
+          <a:lstStyle/>
+          <a:p>
+            <a:pPr algn="ctr"/>
+            <a:endParaRPr lang="ko-KR" altLang="en-US"/>
+          </a:p>
+        </p:txBody>
+      </p:sp>
     </p:spTree>
     <p:extLst>
       <p:ext uri="{BB962C8B-B14F-4D97-AF65-F5344CB8AC3E}">
@@ -15366,6 +15529,7 @@
               <a:lnSpc>
                 <a:spcPct val="150000"/>
               </a:lnSpc>
+              <a:buFont typeface="+mj-lt"/>
               <a:buAutoNum type="arabicPeriod"/>
             </a:pPr>
             <a:r>
@@ -15710,7 +15874,7 @@
             <p:ph idx="1"/>
             <p:extLst>
               <p:ext uri="{D42A27DB-BD31-4B8C-83A1-F6EECF244321}">
-                <p14:modId xmlns:p14="http://schemas.microsoft.com/office/powerpoint/2010/main" val="358657731"/>
+                <p14:modId xmlns:p14="http://schemas.microsoft.com/office/powerpoint/2010/main" val="3866421122"/>
               </p:ext>
             </p:extLst>
           </p:nvPr>
@@ -15832,7 +15996,7 @@
             <p:ph idx="1"/>
             <p:extLst>
               <p:ext uri="{D42A27DB-BD31-4B8C-83A1-F6EECF244321}">
-                <p14:modId xmlns:p14="http://schemas.microsoft.com/office/powerpoint/2010/main" val="3239891108"/>
+                <p14:modId xmlns:p14="http://schemas.microsoft.com/office/powerpoint/2010/main" val="746049341"/>
               </p:ext>
             </p:extLst>
           </p:nvPr>
@@ -16154,7 +16318,7 @@
                   <a:schemeClr val="tx1"/>
                 </a:solidFill>
               </a:rPr>
-              <a:t>Training</a:t>
+              <a:t>Trainer</a:t>
             </a:r>
             <a:endParaRPr lang="ko-KR" altLang="en-US" dirty="0">
               <a:solidFill>
@@ -16499,8 +16663,8 @@
                 <a:t>와  </a:t>
               </a:r>
               <a:r>
-                <a:rPr lang="en-US" altLang="ko-KR" sz="1400" dirty="0"/>
-                <a:t>SSH</a:t>
+                <a:rPr lang="en-US" altLang="ko-KR" sz="1400" b="0" i="0" kern="1200" dirty="0"/>
+                <a:t>CLI</a:t>
               </a:r>
               <a:r>
                 <a:rPr lang="ko-KR" altLang="en-US" sz="1400" dirty="0"/>
@@ -17170,8 +17334,8 @@
         </p:nvSpPr>
         <p:spPr>
           <a:xfrm>
-            <a:off x="10338816" y="3030210"/>
-            <a:ext cx="353568" cy="847113"/>
+            <a:off x="10338816" y="2814646"/>
+            <a:ext cx="353568" cy="1062677"/>
           </a:xfrm>
           <a:prstGeom prst="downArrow">
             <a:avLst>
@@ -17278,8 +17442,8 @@
         </p:nvSpPr>
         <p:spPr>
           <a:xfrm>
-            <a:off x="2389632" y="4013249"/>
-            <a:ext cx="6937248" cy="1912776"/>
+            <a:off x="2314575" y="4229100"/>
+            <a:ext cx="7012305" cy="243662"/>
           </a:xfrm>
           <a:prstGeom prst="rect">
             <a:avLst/>
@@ -17289,7 +17453,7 @@
             <a:solidFill>
               <a:srgbClr val="FFC000"/>
             </a:solidFill>
-            <a:prstDash val="dash"/>
+            <a:prstDash val="solid"/>
           </a:ln>
         </p:spPr>
         <p:style>
@@ -17504,6 +17668,59 @@
           </a:p>
         </p:txBody>
       </p:sp>
+      <p:sp>
+        <p:nvSpPr>
+          <p:cNvPr id="2" name="직사각형 1">
+            <a:extLst>
+              <a:ext uri="{FF2B5EF4-FFF2-40B4-BE49-F238E27FC236}">
+                <a16:creationId xmlns:a16="http://schemas.microsoft.com/office/drawing/2014/main" id="{8EBC6823-8C86-A610-B8CA-AFA900EEB345}"/>
+              </a:ext>
+            </a:extLst>
+          </p:cNvPr>
+          <p:cNvSpPr/>
+          <p:nvPr/>
+        </p:nvSpPr>
+        <p:spPr>
+          <a:xfrm>
+            <a:off x="2314575" y="4023236"/>
+            <a:ext cx="7032117" cy="1884501"/>
+          </a:xfrm>
+          <a:prstGeom prst="rect">
+            <a:avLst/>
+          </a:prstGeom>
+          <a:noFill/>
+          <a:ln>
+            <a:solidFill>
+              <a:schemeClr val="tx1"/>
+            </a:solidFill>
+            <a:prstDash val="dash"/>
+          </a:ln>
+        </p:spPr>
+        <p:style>
+          <a:lnRef idx="2">
+            <a:schemeClr val="accent1">
+              <a:shade val="15000"/>
+            </a:schemeClr>
+          </a:lnRef>
+          <a:fillRef idx="1">
+            <a:schemeClr val="accent1"/>
+          </a:fillRef>
+          <a:effectRef idx="0">
+            <a:schemeClr val="accent1"/>
+          </a:effectRef>
+          <a:fontRef idx="minor">
+            <a:schemeClr val="lt1"/>
+          </a:fontRef>
+        </p:style>
+        <p:txBody>
+          <a:bodyPr rtlCol="0" anchor="ctr"/>
+          <a:lstStyle/>
+          <a:p>
+            <a:pPr algn="ctr"/>
+            <a:endParaRPr lang="ko-KR" altLang="en-US"/>
+          </a:p>
+        </p:txBody>
+      </p:sp>
     </p:spTree>
     <p:extLst>
       <p:ext uri="{BB962C8B-B14F-4D97-AF65-F5344CB8AC3E}">
@@ -17675,7 +17892,7 @@
                   <a:schemeClr val="tx1"/>
                 </a:solidFill>
               </a:rPr>
-              <a:t>Reporting</a:t>
+              <a:t>Reporter</a:t>
             </a:r>
             <a:endParaRPr lang="ko-KR" altLang="en-US" dirty="0">
               <a:solidFill>
@@ -17735,7 +17952,7 @@
                   <a:schemeClr val="tx1"/>
                 </a:solidFill>
               </a:rPr>
-              <a:t>Data Collection</a:t>
+              <a:t>Data Collector</a:t>
             </a:r>
             <a:endParaRPr lang="ko-KR" altLang="en-US" dirty="0">
               <a:solidFill>
@@ -18168,7 +18385,7 @@
                   <a:schemeClr val="tx1"/>
                 </a:solidFill>
               </a:rPr>
-              <a:t>Prediction</a:t>
+              <a:t>Predictor</a:t>
             </a:r>
             <a:endParaRPr lang="ko-KR" altLang="en-US" dirty="0">
               <a:solidFill>
@@ -18594,8 +18811,8 @@
         </p:nvSpPr>
         <p:spPr>
           <a:xfrm>
-            <a:off x="690953" y="2105560"/>
-            <a:ext cx="10505291" cy="1045614"/>
+            <a:off x="690953" y="2445488"/>
+            <a:ext cx="5405047" cy="531628"/>
           </a:xfrm>
           <a:prstGeom prst="rect">
             <a:avLst/>
@@ -18603,7 +18820,7 @@
           <a:noFill/>
           <a:ln w="31750">
             <a:solidFill>
-              <a:srgbClr val="FF0000"/>
+              <a:srgbClr val="00B050"/>
             </a:solidFill>
             <a:prstDash val="dash"/>
           </a:ln>
@@ -18855,6 +19072,59 @@
           <a:p>
             <a:pPr lvl="1"/>
             <a:endParaRPr lang="ko-KR" altLang="en-US" sz="1400" dirty="0"/>
+          </a:p>
+        </p:txBody>
+      </p:sp>
+      <p:sp>
+        <p:nvSpPr>
+          <p:cNvPr id="2" name="직사각형 1">
+            <a:extLst>
+              <a:ext uri="{FF2B5EF4-FFF2-40B4-BE49-F238E27FC236}">
+                <a16:creationId xmlns:a16="http://schemas.microsoft.com/office/drawing/2014/main" id="{862DBEAA-CE6D-311D-E6A1-ABD535025C60}"/>
+              </a:ext>
+            </a:extLst>
+          </p:cNvPr>
+          <p:cNvSpPr/>
+          <p:nvPr/>
+        </p:nvSpPr>
+        <p:spPr>
+          <a:xfrm>
+            <a:off x="673229" y="1265273"/>
+            <a:ext cx="5422771" cy="531628"/>
+          </a:xfrm>
+          <a:prstGeom prst="rect">
+            <a:avLst/>
+          </a:prstGeom>
+          <a:noFill/>
+          <a:ln w="31750">
+            <a:solidFill>
+              <a:srgbClr val="00B050"/>
+            </a:solidFill>
+            <a:prstDash val="dash"/>
+          </a:ln>
+        </p:spPr>
+        <p:style>
+          <a:lnRef idx="2">
+            <a:schemeClr val="accent1">
+              <a:shade val="15000"/>
+            </a:schemeClr>
+          </a:lnRef>
+          <a:fillRef idx="1">
+            <a:schemeClr val="accent1"/>
+          </a:fillRef>
+          <a:effectRef idx="0">
+            <a:schemeClr val="accent1"/>
+          </a:effectRef>
+          <a:fontRef idx="minor">
+            <a:schemeClr val="lt1"/>
+          </a:fontRef>
+        </p:style>
+        <p:txBody>
+          <a:bodyPr rtlCol="0" anchor="ctr"/>
+          <a:lstStyle/>
+          <a:p>
+            <a:pPr algn="ctr"/>
+            <a:endParaRPr lang="ko-KR" altLang="en-US"/>
           </a:p>
         </p:txBody>
       </p:sp>
@@ -19334,7 +19604,7 @@
                   <a:schemeClr val="tx1"/>
                 </a:solidFill>
               </a:rPr>
-              <a:t>Data Collection</a:t>
+              <a:t>Data Collector</a:t>
             </a:r>
             <a:endParaRPr lang="ko-KR" altLang="en-US" dirty="0">
               <a:solidFill>
@@ -19478,7 +19748,7 @@
                   <a:schemeClr val="tx1"/>
                 </a:solidFill>
               </a:rPr>
-              <a:t>Prediction</a:t>
+              <a:t>Predictor</a:t>
             </a:r>
             <a:endParaRPr lang="ko-KR" altLang="en-US" dirty="0">
               <a:solidFill>

</xml_diff>